<commit_message>
Inclusión de Diversas Perspectivas
</commit_message>
<xml_diff>
--- a/03 Presentación.pptx
+++ b/03 Presentación.pptx
@@ -107,6 +107,11 @@
       </a:defRPr>
     </a:lvl9pPr>
   </p:defaultTextStyle>
+  <p:extLst>
+    <p:ext uri="{EFAFB233-063F-42B5-8137-9DF3F51BA10A}">
+      <p15:sldGuideLst xmlns:p15="http://schemas.microsoft.com/office/powerpoint/2012/main"/>
+    </p:ext>
+  </p:extLst>
 </p:presentation>
 </file>
 
@@ -3486,7 +3491,7 @@
         <p:spPr/>
         <p:txBody>
           <a:bodyPr>
-            <a:normAutofit lnSpcReduction="10000"/>
+            <a:normAutofit fontScale="85000" lnSpcReduction="20000"/>
           </a:bodyPr>
           <a:lstStyle/>
           <a:p>
@@ -3562,21 +3567,30 @@
           <a:p>
             <a:r>
               <a:rPr lang="es-ES" dirty="0"/>
-              <a:t>1.3	</a:t>
-            </a:r>
-            <a:r>
-              <a:rPr lang="es-ES" dirty="0">
-                <a:highlight>
-                  <a:srgbClr val="FFFF00"/>
-                </a:highlight>
-              </a:rPr>
               <a:t>Inclusión de Diversas Perspectivas</a:t>
             </a:r>
-            <a:endParaRPr lang="es-EC" dirty="0">
-              <a:highlight>
-                <a:srgbClr val="FFFF00"/>
-              </a:highlight>
-            </a:endParaRPr>
+          </a:p>
+          <a:p>
+            <a:pPr lvl="1"/>
+            <a:r>
+              <a:rPr lang="en-US" dirty="0"/>
+              <a:t>Computing Competencies for Undergraduate Data Science Curricula ACM Data Science Task Force – 2021</a:t>
+            </a:r>
+          </a:p>
+          <a:p>
+            <a:pPr lvl="1"/>
+            <a:r>
+              <a:rPr lang="es-EC" dirty="0"/>
+              <a:t>Computer Science </a:t>
+            </a:r>
+            <a:r>
+              <a:rPr lang="es-EC" dirty="0" err="1"/>
+              <a:t>Curricula</a:t>
+            </a:r>
+            <a:r>
+              <a:rPr lang="es-EC" dirty="0"/>
+              <a:t> 2023</a:t>
+            </a:r>
           </a:p>
         </p:txBody>
       </p:sp>

</xml_diff>

<commit_message>
Contribución al Mercado Laboral
</commit_message>
<xml_diff>
--- a/03 Presentación.pptx
+++ b/03 Presentación.pptx
@@ -3683,7 +3683,9 @@
         </p:nvSpPr>
         <p:spPr/>
         <p:txBody>
-          <a:bodyPr/>
+          <a:bodyPr>
+            <a:normAutofit fontScale="92500" lnSpcReduction="10000"/>
+          </a:bodyPr>
           <a:lstStyle/>
           <a:p>
             <a:pPr marL="514350" indent="-514350">
@@ -3692,21 +3694,18 @@
             </a:pPr>
             <a:r>
               <a:rPr lang="es-ES" dirty="0"/>
-              <a:t>Respuesta a las Necesidades Nacionales </a:t>
+              <a:t>Respuesta a las Necesidades Nacionales (Planificación , 2024)</a:t>
             </a:r>
           </a:p>
           <a:p>
             <a:pPr lvl="1"/>
             <a:r>
+              <a:rPr lang="es-ES" b="1" dirty="0"/>
+              <a:t>Política 2.4: </a:t>
+            </a:r>
+            <a:r>
               <a:rPr lang="es-ES" dirty="0"/>
-              <a:t>Objetivo 9: Construir infraestructuras resilientes, promover la industrialización sostenible y fomentar la innovación</a:t>
-            </a:r>
-          </a:p>
-          <a:p>
-            <a:pPr lvl="1"/>
-            <a:r>
-              <a:rPr lang="es-ES" dirty="0"/>
-              <a:t>Objetivo 11: Lograr que las ciudades sean más inclusivas, seguras, resilientes y sostenibles</a:t>
+              <a:t>Desarrollar el sistema de educación superior a través de nuevas modalidades de estudio, carreras y profundización de la educación técnica tecnológica como mecanismo para la profesionalización de la población, en el Plan de Desarrollo para el Nuevo Ecuador 2024-2025</a:t>
             </a:r>
           </a:p>
           <a:p>
@@ -3716,7 +3715,29 @@
             </a:pPr>
             <a:r>
               <a:rPr lang="es-ES" dirty="0"/>
-              <a:t>Respuesta a Necesidades Globales </a:t>
+              <a:t>Respuesta a Necesidades Globales (ONU, 2024)</a:t>
+            </a:r>
+          </a:p>
+          <a:p>
+            <a:pPr lvl="1"/>
+            <a:r>
+              <a:rPr lang="es-ES" b="1" dirty="0"/>
+              <a:t>Objetivo 9</a:t>
+            </a:r>
+            <a:r>
+              <a:rPr lang="es-ES" dirty="0"/>
+              <a:t>: Construir infraestructuras resilientes, promover la industrialización sostenible y fomentar la innovación</a:t>
+            </a:r>
+          </a:p>
+          <a:p>
+            <a:pPr lvl="1"/>
+            <a:r>
+              <a:rPr lang="es-ES" b="1" dirty="0"/>
+              <a:t>Objetivo 11</a:t>
+            </a:r>
+            <a:r>
+              <a:rPr lang="es-ES" dirty="0"/>
+              <a:t>: Lograr que las ciudades sean más inclusivas, seguras, resilientes y sostenibles</a:t>
             </a:r>
           </a:p>
           <a:p>
@@ -3731,6 +3752,33 @@
                 </a:highlight>
               </a:rPr>
               <a:t>Contribución al Mercado Laboral</a:t>
+            </a:r>
+          </a:p>
+          <a:p>
+            <a:pPr lvl="1"/>
+            <a:r>
+              <a:rPr lang="es-EC" dirty="0" err="1">
+                <a:highlight>
+                  <a:srgbClr val="FFFF00"/>
+                </a:highlight>
+              </a:rPr>
+              <a:t>WeF</a:t>
+            </a:r>
+            <a:endParaRPr lang="es-EC" dirty="0">
+              <a:highlight>
+                <a:srgbClr val="FFFF00"/>
+              </a:highlight>
+            </a:endParaRPr>
+          </a:p>
+          <a:p>
+            <a:pPr lvl="1"/>
+            <a:r>
+              <a:rPr lang="es-EC">
+                <a:highlight>
+                  <a:srgbClr val="FFFF00"/>
+                </a:highlight>
+              </a:rPr>
+              <a:t>Comité Consultivo</a:t>
             </a:r>
             <a:endParaRPr lang="es-EC" dirty="0">
               <a:highlight>
@@ -3934,8 +3982,23 @@
         </p:nvSpPr>
         <p:spPr/>
         <p:txBody>
-          <a:bodyPr/>
-          <a:lstStyle/>
+          <a:bodyPr>
+            <a:normAutofit fontScale="85000" lnSpcReduction="20000"/>
+          </a:bodyPr>
+          <a:lstStyle/>
+          <a:p>
+            <a:r>
+              <a:rPr lang="es-ES" dirty="0"/>
+              <a:t>Planificación, S. N. (2024). Plan de Desarrollo para el Nuevo Ecuador. Quito.</a:t>
+            </a:r>
+          </a:p>
+          <a:p>
+            <a:r>
+              <a:rPr lang="es-ES" dirty="0"/>
+              <a:t>ONU, N. U. (13 de Abril de 2024). Objetivos y metas de desarrollo sostenible. Obtenido de Objetivos y metas de desarrollo sostenible - Desarrollo Sostenible.: https://www.un.org/sustainabledevelopment/es/objetivos-de-desarrollo-sostenible/</a:t>
+            </a:r>
+            <a:endParaRPr lang="en-US" dirty="0"/>
+          </a:p>
           <a:p>
             <a:r>
               <a:rPr lang="en-US" dirty="0"/>

</xml_diff>

<commit_message>
Alineación con Tendencias Globales
</commit_message>
<xml_diff>
--- a/03 Presentación.pptx
+++ b/03 Presentación.pptx
@@ -3759,36 +3759,6 @@
             <a:pPr lvl="1"/>
             <a:r>
               <a:rPr lang="es-EC" dirty="0"/>
-              <a:t>Future </a:t>
-            </a:r>
-            <a:r>
-              <a:rPr lang="es-EC" dirty="0" err="1"/>
-              <a:t>of</a:t>
-            </a:r>
-            <a:r>
-              <a:rPr lang="es-EC" dirty="0"/>
-              <a:t> Jobs </a:t>
-            </a:r>
-            <a:r>
-              <a:rPr lang="es-EC" dirty="0" err="1"/>
-              <a:t>Report</a:t>
-            </a:r>
-            <a:r>
-              <a:rPr lang="es-EC" dirty="0"/>
-              <a:t> 2025 del Foro Económico Mundial (WEF, 2025)</a:t>
-            </a:r>
-          </a:p>
-          <a:p>
-            <a:pPr lvl="2"/>
-            <a:r>
-              <a:rPr lang="es-EC" dirty="0"/>
-              <a:t>Pensamiento analítico, sistémico, análisis de grandes volúmenes de datos y programación.</a:t>
-            </a:r>
-          </a:p>
-          <a:p>
-            <a:pPr lvl="1"/>
-            <a:r>
-              <a:rPr lang="es-EC" dirty="0"/>
               <a:t>ABET</a:t>
             </a:r>
           </a:p>
@@ -3836,7 +3806,28 @@
               <a:rPr lang="es-ES" dirty="0"/>
               <a:t>Integración de modelos de lenguaje, visión por computadora, razonamiento complejo y agentes autónomos se vuelve cada vez más esencial</a:t>
             </a:r>
-            <a:endParaRPr lang="es-EC" dirty="0"/>
+          </a:p>
+          <a:p>
+            <a:pPr lvl="1"/>
+            <a:r>
+              <a:rPr lang="es-ES" dirty="0"/>
+              <a:t>Expertos en la industria y la academia</a:t>
+            </a:r>
+          </a:p>
+          <a:p>
+            <a:pPr lvl="2"/>
+            <a:r>
+              <a:rPr lang="es-EC" dirty="0"/>
+              <a:t>Teóricas fundamentales (Mat y CS), trabajo en entornos distribuidos y en la nube </a:t>
+            </a:r>
+            <a:r>
+              <a:rPr lang="es-EC"/>
+              <a:t>y habilidades </a:t>
+            </a:r>
+            <a:r>
+              <a:rPr lang="es-EC" dirty="0"/>
+              <a:t>transversales</a:t>
+            </a:r>
           </a:p>
         </p:txBody>
       </p:sp>
@@ -3920,24 +3911,33 @@
           <a:bodyPr/>
           <a:lstStyle/>
           <a:p>
-            <a:r>
-              <a:rPr lang="es-ES" dirty="0"/>
-              <a:t>Cómo se asocian con las tendencias y prospectiva de la profesión</a:t>
-            </a:r>
-          </a:p>
-          <a:p>
             <a:pPr marL="514350" indent="-514350">
               <a:buFont typeface="+mj-lt"/>
               <a:buAutoNum type="arabicPeriod"/>
             </a:pPr>
             <a:r>
-              <a:rPr lang="es-ES" dirty="0">
-                <a:highlight>
-                  <a:srgbClr val="FFFF00"/>
-                </a:highlight>
-              </a:rPr>
+              <a:rPr lang="es-ES" dirty="0"/>
               <a:t>Alineación con Tendencias Globales</a:t>
             </a:r>
+          </a:p>
+          <a:p>
+            <a:pPr lvl="1"/>
+            <a:r>
+              <a:rPr lang="es-EC" dirty="0"/>
+              <a:t>Future of Jobs Report 2025 del Foro Económico Mundial (WEF, 2025)</a:t>
+            </a:r>
+          </a:p>
+          <a:p>
+            <a:pPr lvl="2"/>
+            <a:r>
+              <a:rPr lang="es-EC" dirty="0"/>
+              <a:t>Pensamiento analítico, sistémico, análisis de grandes volúmenes de datos y programación.</a:t>
+            </a:r>
+            <a:endParaRPr lang="es-ES" dirty="0">
+              <a:highlight>
+                <a:srgbClr val="FFFF00"/>
+              </a:highlight>
+            </a:endParaRPr>
           </a:p>
           <a:p>
             <a:pPr marL="514350" indent="-514350">

</xml_diff>

<commit_message>
Vinculación con Estudios Prospectivos
</commit_message>
<xml_diff>
--- a/03 Presentación.pptx
+++ b/03 Presentación.pptx
@@ -3878,7 +3878,9 @@
         </p:nvSpPr>
         <p:spPr/>
         <p:txBody>
-          <a:bodyPr/>
+          <a:bodyPr>
+            <a:normAutofit lnSpcReduction="10000"/>
+          </a:bodyPr>
           <a:lstStyle/>
           <a:p>
             <a:pPr marL="514350" indent="-514350">
@@ -3934,8 +3936,44 @@
             </a:r>
           </a:p>
           <a:p>
-            <a:pPr lvl="1"/>
-            <a:endParaRPr lang="es-EC" dirty="0"/>
+            <a:pPr marL="971550" lvl="1" indent="-514350">
+              <a:buFont typeface="+mj-lt"/>
+              <a:buAutoNum type="arabicPeriod"/>
+            </a:pPr>
+            <a:r>
+              <a:rPr lang="es-ES" dirty="0"/>
+              <a:t>Rápida adopción de tecnologías como la inteligencia artificial generativa (</a:t>
+            </a:r>
+            <a:r>
+              <a:rPr lang="es-ES" dirty="0" err="1"/>
+              <a:t>GenAI</a:t>
+            </a:r>
+            <a:r>
+              <a:rPr lang="es-ES" dirty="0"/>
+              <a:t>), el procesamiento de información, y la automatización de procesos (WEF, 2025).</a:t>
+            </a:r>
+          </a:p>
+          <a:p>
+            <a:pPr marL="971550" lvl="1" indent="-514350">
+              <a:buFont typeface="+mj-lt"/>
+              <a:buAutoNum type="arabicPeriod"/>
+            </a:pPr>
+            <a:r>
+              <a:rPr lang="es-ES" dirty="0"/>
+              <a:t>Incremento significativo en la productividad de desarrolladores con GitHub </a:t>
+            </a:r>
+            <a:r>
+              <a:rPr lang="es-ES" dirty="0" err="1"/>
+              <a:t>Copilot</a:t>
+            </a:r>
+            <a:r>
+              <a:rPr lang="es-ES" dirty="0"/>
+              <a:t> </a:t>
+            </a:r>
+            <a:r>
+              <a:rPr lang="es-EC" dirty="0"/>
+              <a:t>.</a:t>
+            </a:r>
           </a:p>
         </p:txBody>
       </p:sp>
@@ -4016,7 +4054,7 @@
         <p:spPr/>
         <p:txBody>
           <a:bodyPr>
-            <a:normAutofit fontScale="77500" lnSpcReduction="20000"/>
+            <a:normAutofit fontScale="62500" lnSpcReduction="20000"/>
           </a:bodyPr>
           <a:lstStyle/>
           <a:p>
@@ -4204,7 +4242,26 @@
             </a:r>
             <a:r>
               <a:rPr lang="en-US" dirty="0"/>
-              <a:t> de The Future of Jobs Report 2025: https://reports.weforum.org/docs/WEF_Future_of_Jobs_Report_2025.pdf</a:t>
+              <a:t> de The Future of Jobs Report 2025: </a:t>
+            </a:r>
+            <a:r>
+              <a:rPr lang="en-US" dirty="0">
+                <a:hlinkClick r:id="rId2"/>
+              </a:rPr>
+              <a:t>https://reports.weforum.org/docs/WEF_Future_of_Jobs_Report_2025.pdf</a:t>
+            </a:r>
+            <a:endParaRPr lang="en-US" dirty="0"/>
+          </a:p>
+          <a:p>
+            <a:r>
+              <a:rPr lang="en-US" dirty="0"/>
+              <a:t>Cui, Z. a. (2025). The Effects of Generative AI on High-Skilled Work: Evidence from Three Field Experiments with Software Developers</a:t>
+            </a:r>
+          </a:p>
+          <a:p>
+            <a:r>
+              <a:rPr lang="en-US" dirty="0"/>
+              <a:t>Song, F., Agarwal, A., &amp; Wen, W. (2024). The Impact of Generative AI on Collaborative Open-Source Software Development: Evidence from GitHub Copilot.</a:t>
             </a:r>
             <a:endParaRPr lang="es-EC" dirty="0"/>
           </a:p>

</xml_diff>